<commit_message>
Nộp Báo cáo tuần #1
</commit_message>
<xml_diff>
--- a/Document/Tuần 04 (01102015)/Nộp lên server/Báo cáo tổng hợp.pptx
+++ b/Document/Tuần 04 (01102015)/Nộp lên server/Báo cáo tổng hợp.pptx
@@ -4,6 +4,9 @@
   <p:sldMasterIdLst>
     <p:sldMasterId id="2147483648" r:id="rId1"/>
   </p:sldMasterIdLst>
+  <p:notesMasterIdLst>
+    <p:notesMasterId r:id="rId18"/>
+  </p:notesMasterIdLst>
   <p:sldIdLst>
     <p:sldId id="261" r:id="rId2"/>
     <p:sldId id="283" r:id="rId3"/>
@@ -1232,6 +1235,563 @@
       <dsp:cNvGrpSpPr/>
     </dsp:nvGrpSpPr>
     <dsp:grpSpPr/>
+    <dsp:sp modelId="{33C48E77-9212-4383-8D73-9D0C09356156}">
+      <dsp:nvSpPr>
+        <dsp:cNvPr id="0" name=""/>
+        <dsp:cNvSpPr/>
+      </dsp:nvSpPr>
+      <dsp:spPr>
+        <a:xfrm>
+          <a:off x="-5729451" y="-876975"/>
+          <a:ext cx="6821251" cy="6821251"/>
+        </a:xfrm>
+        <a:prstGeom prst="blockArc">
+          <a:avLst>
+            <a:gd name="adj1" fmla="val 18900000"/>
+            <a:gd name="adj2" fmla="val 2700000"/>
+            <a:gd name="adj3" fmla="val 317"/>
+          </a:avLst>
+        </a:prstGeom>
+        <a:noFill/>
+        <a:ln w="12700" cap="flat" cmpd="sng" algn="ctr">
+          <a:solidFill>
+            <a:schemeClr val="accent1">
+              <a:shade val="60000"/>
+              <a:hueOff val="0"/>
+              <a:satOff val="0"/>
+              <a:lumOff val="0"/>
+              <a:alphaOff val="0"/>
+            </a:schemeClr>
+          </a:solidFill>
+          <a:prstDash val="solid"/>
+          <a:miter lim="800000"/>
+        </a:ln>
+        <a:effectLst/>
+      </dsp:spPr>
+      <dsp:style>
+        <a:lnRef idx="2">
+          <a:scrgbClr r="0" g="0" b="0"/>
+        </a:lnRef>
+        <a:fillRef idx="0">
+          <a:scrgbClr r="0" g="0" b="0"/>
+        </a:fillRef>
+        <a:effectRef idx="0">
+          <a:scrgbClr r="0" g="0" b="0"/>
+        </a:effectRef>
+        <a:fontRef idx="minor"/>
+      </dsp:style>
+    </dsp:sp>
+    <dsp:sp modelId="{87B767DD-175E-47B6-82B4-0CEF087C409A}">
+      <dsp:nvSpPr>
+        <dsp:cNvPr id="0" name=""/>
+        <dsp:cNvSpPr/>
+      </dsp:nvSpPr>
+      <dsp:spPr>
+        <a:xfrm>
+          <a:off x="571501" y="389574"/>
+          <a:ext cx="9415866" cy="779553"/>
+        </a:xfrm>
+        <a:prstGeom prst="rect">
+          <a:avLst/>
+        </a:prstGeom>
+        <a:solidFill>
+          <a:schemeClr val="accent1">
+            <a:hueOff val="0"/>
+            <a:satOff val="0"/>
+            <a:lumOff val="0"/>
+            <a:alphaOff val="0"/>
+          </a:schemeClr>
+        </a:solidFill>
+        <a:ln w="12700" cap="flat" cmpd="sng" algn="ctr">
+          <a:solidFill>
+            <a:schemeClr val="lt1">
+              <a:hueOff val="0"/>
+              <a:satOff val="0"/>
+              <a:lumOff val="0"/>
+              <a:alphaOff val="0"/>
+            </a:schemeClr>
+          </a:solidFill>
+          <a:prstDash val="solid"/>
+          <a:miter lim="800000"/>
+        </a:ln>
+        <a:effectLst/>
+      </dsp:spPr>
+      <dsp:style>
+        <a:lnRef idx="2">
+          <a:scrgbClr r="0" g="0" b="0"/>
+        </a:lnRef>
+        <a:fillRef idx="1">
+          <a:scrgbClr r="0" g="0" b="0"/>
+        </a:fillRef>
+        <a:effectRef idx="0">
+          <a:scrgbClr r="0" g="0" b="0"/>
+        </a:effectRef>
+        <a:fontRef idx="minor">
+          <a:schemeClr val="lt1"/>
+        </a:fontRef>
+      </dsp:style>
+      <dsp:txBody>
+        <a:bodyPr spcFirstLastPara="0" vert="horz" wrap="square" lIns="618771" tIns="81280" rIns="81280" bIns="81280" numCol="1" spcCol="1270" anchor="ctr" anchorCtr="0">
+          <a:noAutofit/>
+        </a:bodyPr>
+        <a:lstStyle/>
+        <a:p>
+          <a:pPr lvl="0" algn="l" defTabSz="1422400">
+            <a:lnSpc>
+              <a:spcPct val="90000"/>
+            </a:lnSpc>
+            <a:spcBef>
+              <a:spcPct val="0"/>
+            </a:spcBef>
+            <a:spcAft>
+              <a:spcPct val="35000"/>
+            </a:spcAft>
+          </a:pPr>
+          <a:r>
+            <a:rPr lang="en-US" sz="3200" kern="1200" smtClean="0"/>
+            <a:t>Giới thiệu thành viên</a:t>
+          </a:r>
+          <a:endParaRPr lang="en-US" sz="3200" kern="1200"/>
+        </a:p>
+      </dsp:txBody>
+      <dsp:txXfrm>
+        <a:off x="571501" y="389574"/>
+        <a:ext cx="9415866" cy="779553"/>
+      </dsp:txXfrm>
+    </dsp:sp>
+    <dsp:sp modelId="{F673AD10-B46D-4DCF-961B-DBA785F19A00}">
+      <dsp:nvSpPr>
+        <dsp:cNvPr id="0" name=""/>
+        <dsp:cNvSpPr/>
+      </dsp:nvSpPr>
+      <dsp:spPr>
+        <a:xfrm>
+          <a:off x="84280" y="292129"/>
+          <a:ext cx="974441" cy="974441"/>
+        </a:xfrm>
+        <a:prstGeom prst="ellipse">
+          <a:avLst/>
+        </a:prstGeom>
+        <a:solidFill>
+          <a:schemeClr val="lt1">
+            <a:hueOff val="0"/>
+            <a:satOff val="0"/>
+            <a:lumOff val="0"/>
+            <a:alphaOff val="0"/>
+          </a:schemeClr>
+        </a:solidFill>
+        <a:ln w="12700" cap="flat" cmpd="sng" algn="ctr">
+          <a:solidFill>
+            <a:schemeClr val="accent1">
+              <a:hueOff val="0"/>
+              <a:satOff val="0"/>
+              <a:lumOff val="0"/>
+              <a:alphaOff val="0"/>
+            </a:schemeClr>
+          </a:solidFill>
+          <a:prstDash val="solid"/>
+          <a:miter lim="800000"/>
+        </a:ln>
+        <a:effectLst/>
+      </dsp:spPr>
+      <dsp:style>
+        <a:lnRef idx="2">
+          <a:scrgbClr r="0" g="0" b="0"/>
+        </a:lnRef>
+        <a:fillRef idx="1">
+          <a:scrgbClr r="0" g="0" b="0"/>
+        </a:fillRef>
+        <a:effectRef idx="0">
+          <a:scrgbClr r="0" g="0" b="0"/>
+        </a:effectRef>
+        <a:fontRef idx="minor"/>
+      </dsp:style>
+    </dsp:sp>
+    <dsp:sp modelId="{11963B7E-6EA5-4088-A97B-CADF26B073DB}">
+      <dsp:nvSpPr>
+        <dsp:cNvPr id="0" name=""/>
+        <dsp:cNvSpPr/>
+      </dsp:nvSpPr>
+      <dsp:spPr>
+        <a:xfrm>
+          <a:off x="1018436" y="1559106"/>
+          <a:ext cx="8968930" cy="779553"/>
+        </a:xfrm>
+        <a:prstGeom prst="rect">
+          <a:avLst/>
+        </a:prstGeom>
+        <a:solidFill>
+          <a:schemeClr val="accent1">
+            <a:hueOff val="0"/>
+            <a:satOff val="0"/>
+            <a:lumOff val="0"/>
+            <a:alphaOff val="0"/>
+          </a:schemeClr>
+        </a:solidFill>
+        <a:ln w="12700" cap="flat" cmpd="sng" algn="ctr">
+          <a:solidFill>
+            <a:schemeClr val="lt1">
+              <a:hueOff val="0"/>
+              <a:satOff val="0"/>
+              <a:lumOff val="0"/>
+              <a:alphaOff val="0"/>
+            </a:schemeClr>
+          </a:solidFill>
+          <a:prstDash val="solid"/>
+          <a:miter lim="800000"/>
+        </a:ln>
+        <a:effectLst/>
+      </dsp:spPr>
+      <dsp:style>
+        <a:lnRef idx="2">
+          <a:scrgbClr r="0" g="0" b="0"/>
+        </a:lnRef>
+        <a:fillRef idx="1">
+          <a:scrgbClr r="0" g="0" b="0"/>
+        </a:fillRef>
+        <a:effectRef idx="0">
+          <a:scrgbClr r="0" g="0" b="0"/>
+        </a:effectRef>
+        <a:fontRef idx="minor">
+          <a:schemeClr val="lt1"/>
+        </a:fontRef>
+      </dsp:style>
+      <dsp:txBody>
+        <a:bodyPr spcFirstLastPara="0" vert="horz" wrap="square" lIns="618771" tIns="182880" rIns="81280" bIns="81280" numCol="1" spcCol="1270" anchor="ctr" anchorCtr="0">
+          <a:noAutofit/>
+        </a:bodyPr>
+        <a:lstStyle/>
+        <a:p>
+          <a:pPr lvl="0" algn="l" defTabSz="1422400">
+            <a:lnSpc>
+              <a:spcPct val="90000"/>
+            </a:lnSpc>
+            <a:spcBef>
+              <a:spcPct val="0"/>
+            </a:spcBef>
+            <a:spcAft>
+              <a:spcPct val="35000"/>
+            </a:spcAft>
+          </a:pPr>
+          <a:r>
+            <a:rPr lang="en-US" sz="3200" kern="1200" smtClean="0"/>
+            <a:t/>
+          </a:r>
+          <a:br>
+            <a:rPr lang="en-US" sz="3200" kern="1200" smtClean="0"/>
+          </a:br>
+          <a:r>
+            <a:rPr lang="en-US" sz="3200" kern="1200" smtClean="0"/>
+            <a:t>Đặc tả quy trình bán hàng online							</a:t>
+          </a:r>
+          <a:endParaRPr lang="en-US" sz="3200" kern="1200"/>
+        </a:p>
+      </dsp:txBody>
+      <dsp:txXfrm>
+        <a:off x="1018436" y="1559106"/>
+        <a:ext cx="8968930" cy="779553"/>
+      </dsp:txXfrm>
+    </dsp:sp>
+    <dsp:sp modelId="{C81D5C05-845B-4987-A233-4395149BADD3}">
+      <dsp:nvSpPr>
+        <dsp:cNvPr id="0" name=""/>
+        <dsp:cNvSpPr/>
+      </dsp:nvSpPr>
+      <dsp:spPr>
+        <a:xfrm>
+          <a:off x="531215" y="1461662"/>
+          <a:ext cx="974441" cy="974441"/>
+        </a:xfrm>
+        <a:prstGeom prst="ellipse">
+          <a:avLst/>
+        </a:prstGeom>
+        <a:solidFill>
+          <a:schemeClr val="lt1">
+            <a:hueOff val="0"/>
+            <a:satOff val="0"/>
+            <a:lumOff val="0"/>
+            <a:alphaOff val="0"/>
+          </a:schemeClr>
+        </a:solidFill>
+        <a:ln w="12700" cap="flat" cmpd="sng" algn="ctr">
+          <a:solidFill>
+            <a:schemeClr val="accent1">
+              <a:hueOff val="0"/>
+              <a:satOff val="0"/>
+              <a:lumOff val="0"/>
+              <a:alphaOff val="0"/>
+            </a:schemeClr>
+          </a:solidFill>
+          <a:prstDash val="solid"/>
+          <a:miter lim="800000"/>
+        </a:ln>
+        <a:effectLst/>
+      </dsp:spPr>
+      <dsp:style>
+        <a:lnRef idx="2">
+          <a:scrgbClr r="0" g="0" b="0"/>
+        </a:lnRef>
+        <a:fillRef idx="1">
+          <a:scrgbClr r="0" g="0" b="0"/>
+        </a:fillRef>
+        <a:effectRef idx="0">
+          <a:scrgbClr r="0" g="0" b="0"/>
+        </a:effectRef>
+        <a:fontRef idx="minor"/>
+      </dsp:style>
+    </dsp:sp>
+    <dsp:sp modelId="{F8A4D58E-73D8-4171-BA73-B3CF1FC2BB2C}">
+      <dsp:nvSpPr>
+        <dsp:cNvPr id="0" name=""/>
+        <dsp:cNvSpPr/>
+      </dsp:nvSpPr>
+      <dsp:spPr>
+        <a:xfrm>
+          <a:off x="1018436" y="2728639"/>
+          <a:ext cx="8968930" cy="779553"/>
+        </a:xfrm>
+        <a:prstGeom prst="rect">
+          <a:avLst/>
+        </a:prstGeom>
+        <a:solidFill>
+          <a:schemeClr val="accent1">
+            <a:hueOff val="0"/>
+            <a:satOff val="0"/>
+            <a:lumOff val="0"/>
+            <a:alphaOff val="0"/>
+          </a:schemeClr>
+        </a:solidFill>
+        <a:ln w="12700" cap="flat" cmpd="sng" algn="ctr">
+          <a:solidFill>
+            <a:schemeClr val="lt1">
+              <a:hueOff val="0"/>
+              <a:satOff val="0"/>
+              <a:lumOff val="0"/>
+              <a:alphaOff val="0"/>
+            </a:schemeClr>
+          </a:solidFill>
+          <a:prstDash val="solid"/>
+          <a:miter lim="800000"/>
+        </a:ln>
+        <a:effectLst/>
+      </dsp:spPr>
+      <dsp:style>
+        <a:lnRef idx="2">
+          <a:scrgbClr r="0" g="0" b="0"/>
+        </a:lnRef>
+        <a:fillRef idx="1">
+          <a:scrgbClr r="0" g="0" b="0"/>
+        </a:fillRef>
+        <a:effectRef idx="0">
+          <a:scrgbClr r="0" g="0" b="0"/>
+        </a:effectRef>
+        <a:fontRef idx="minor">
+          <a:schemeClr val="lt1"/>
+        </a:fontRef>
+      </dsp:style>
+      <dsp:txBody>
+        <a:bodyPr spcFirstLastPara="0" vert="horz" wrap="square" lIns="618771" tIns="81280" rIns="81280" bIns="81280" numCol="1" spcCol="1270" anchor="ctr" anchorCtr="0">
+          <a:noAutofit/>
+        </a:bodyPr>
+        <a:lstStyle/>
+        <a:p>
+          <a:pPr lvl="0" algn="l" defTabSz="1422400">
+            <a:lnSpc>
+              <a:spcPct val="90000"/>
+            </a:lnSpc>
+            <a:spcBef>
+              <a:spcPct val="0"/>
+            </a:spcBef>
+            <a:spcAft>
+              <a:spcPct val="35000"/>
+            </a:spcAft>
+          </a:pPr>
+          <a:r>
+            <a:rPr lang="en-US" sz="3200" kern="1200" smtClean="0"/>
+            <a:t>Use case nghiệp vụ			</a:t>
+          </a:r>
+          <a:endParaRPr lang="en-US" sz="3200" kern="1200"/>
+        </a:p>
+      </dsp:txBody>
+      <dsp:txXfrm>
+        <a:off x="1018436" y="2728639"/>
+        <a:ext cx="8968930" cy="779553"/>
+      </dsp:txXfrm>
+    </dsp:sp>
+    <dsp:sp modelId="{30AB4D2A-82F7-45B7-86C3-D4700FBDC001}">
+      <dsp:nvSpPr>
+        <dsp:cNvPr id="0" name=""/>
+        <dsp:cNvSpPr/>
+      </dsp:nvSpPr>
+      <dsp:spPr>
+        <a:xfrm>
+          <a:off x="531215" y="2631195"/>
+          <a:ext cx="974441" cy="974441"/>
+        </a:xfrm>
+        <a:prstGeom prst="ellipse">
+          <a:avLst/>
+        </a:prstGeom>
+        <a:solidFill>
+          <a:schemeClr val="lt1">
+            <a:hueOff val="0"/>
+            <a:satOff val="0"/>
+            <a:lumOff val="0"/>
+            <a:alphaOff val="0"/>
+          </a:schemeClr>
+        </a:solidFill>
+        <a:ln w="12700" cap="flat" cmpd="sng" algn="ctr">
+          <a:solidFill>
+            <a:schemeClr val="accent1">
+              <a:hueOff val="0"/>
+              <a:satOff val="0"/>
+              <a:lumOff val="0"/>
+              <a:alphaOff val="0"/>
+            </a:schemeClr>
+          </a:solidFill>
+          <a:prstDash val="solid"/>
+          <a:miter lim="800000"/>
+        </a:ln>
+        <a:effectLst/>
+      </dsp:spPr>
+      <dsp:style>
+        <a:lnRef idx="2">
+          <a:scrgbClr r="0" g="0" b="0"/>
+        </a:lnRef>
+        <a:fillRef idx="1">
+          <a:scrgbClr r="0" g="0" b="0"/>
+        </a:fillRef>
+        <a:effectRef idx="0">
+          <a:scrgbClr r="0" g="0" b="0"/>
+        </a:effectRef>
+        <a:fontRef idx="minor"/>
+      </dsp:style>
+    </dsp:sp>
+    <dsp:sp modelId="{1B506A39-BE20-483F-83C4-E68445F2A000}">
+      <dsp:nvSpPr>
+        <dsp:cNvPr id="0" name=""/>
+        <dsp:cNvSpPr/>
+      </dsp:nvSpPr>
+      <dsp:spPr>
+        <a:xfrm>
+          <a:off x="571501" y="3898172"/>
+          <a:ext cx="9415866" cy="779553"/>
+        </a:xfrm>
+        <a:prstGeom prst="rect">
+          <a:avLst/>
+        </a:prstGeom>
+        <a:solidFill>
+          <a:schemeClr val="accent1">
+            <a:hueOff val="0"/>
+            <a:satOff val="0"/>
+            <a:lumOff val="0"/>
+            <a:alphaOff val="0"/>
+          </a:schemeClr>
+        </a:solidFill>
+        <a:ln w="12700" cap="flat" cmpd="sng" algn="ctr">
+          <a:solidFill>
+            <a:schemeClr val="lt1">
+              <a:hueOff val="0"/>
+              <a:satOff val="0"/>
+              <a:lumOff val="0"/>
+              <a:alphaOff val="0"/>
+            </a:schemeClr>
+          </a:solidFill>
+          <a:prstDash val="solid"/>
+          <a:miter lim="800000"/>
+        </a:ln>
+        <a:effectLst/>
+      </dsp:spPr>
+      <dsp:style>
+        <a:lnRef idx="2">
+          <a:scrgbClr r="0" g="0" b="0"/>
+        </a:lnRef>
+        <a:fillRef idx="1">
+          <a:scrgbClr r="0" g="0" b="0"/>
+        </a:fillRef>
+        <a:effectRef idx="0">
+          <a:scrgbClr r="0" g="0" b="0"/>
+        </a:effectRef>
+        <a:fontRef idx="minor">
+          <a:schemeClr val="lt1"/>
+        </a:fontRef>
+      </dsp:style>
+      <dsp:txBody>
+        <a:bodyPr spcFirstLastPara="0" vert="horz" wrap="square" lIns="618771" tIns="81280" rIns="81280" bIns="81280" numCol="1" spcCol="1270" anchor="ctr" anchorCtr="0">
+          <a:noAutofit/>
+        </a:bodyPr>
+        <a:lstStyle/>
+        <a:p>
+          <a:pPr lvl="0" algn="l" defTabSz="1422400">
+            <a:lnSpc>
+              <a:spcPct val="90000"/>
+            </a:lnSpc>
+            <a:spcBef>
+              <a:spcPct val="0"/>
+            </a:spcBef>
+            <a:spcAft>
+              <a:spcPct val="35000"/>
+            </a:spcAft>
+          </a:pPr>
+          <a:r>
+            <a:rPr lang="en-US" sz="3200" kern="1200" smtClean="0"/>
+            <a:t>Sơ đồ activity diagram</a:t>
+          </a:r>
+          <a:endParaRPr lang="en-US" sz="3200" kern="1200"/>
+        </a:p>
+      </dsp:txBody>
+      <dsp:txXfrm>
+        <a:off x="571501" y="3898172"/>
+        <a:ext cx="9415866" cy="779553"/>
+      </dsp:txXfrm>
+    </dsp:sp>
+    <dsp:sp modelId="{0E63F44E-6D19-40E7-9AC5-C6DE5060B4FF}">
+      <dsp:nvSpPr>
+        <dsp:cNvPr id="0" name=""/>
+        <dsp:cNvSpPr/>
+      </dsp:nvSpPr>
+      <dsp:spPr>
+        <a:xfrm>
+          <a:off x="84280" y="3800728"/>
+          <a:ext cx="974441" cy="974441"/>
+        </a:xfrm>
+        <a:prstGeom prst="ellipse">
+          <a:avLst/>
+        </a:prstGeom>
+        <a:solidFill>
+          <a:schemeClr val="lt1">
+            <a:hueOff val="0"/>
+            <a:satOff val="0"/>
+            <a:lumOff val="0"/>
+            <a:alphaOff val="0"/>
+          </a:schemeClr>
+        </a:solidFill>
+        <a:ln w="12700" cap="flat" cmpd="sng" algn="ctr">
+          <a:solidFill>
+            <a:schemeClr val="accent1">
+              <a:hueOff val="0"/>
+              <a:satOff val="0"/>
+              <a:lumOff val="0"/>
+              <a:alphaOff val="0"/>
+            </a:schemeClr>
+          </a:solidFill>
+          <a:prstDash val="solid"/>
+          <a:miter lim="800000"/>
+        </a:ln>
+        <a:effectLst/>
+      </dsp:spPr>
+      <dsp:style>
+        <a:lnRef idx="2">
+          <a:scrgbClr r="0" g="0" b="0"/>
+        </a:lnRef>
+        <a:fillRef idx="1">
+          <a:scrgbClr r="0" g="0" b="0"/>
+        </a:fillRef>
+        <a:effectRef idx="0">
+          <a:scrgbClr r="0" g="0" b="0"/>
+        </a:effectRef>
+        <a:fontRef idx="minor"/>
+      </dsp:style>
+    </dsp:sp>
   </dsp:spTree>
 </dsp:drawing>
 </file>
@@ -3548,6 +4108,440 @@
 </dgm:styleDef>
 </file>
 
+<file path=ppt/notesMasters/notesMaster1.xml><?xml version="1.0" encoding="utf-8"?>
+<p:notesMaster xmlns:a="http://schemas.openxmlformats.org/drawingml/2006/main" xmlns:r="http://schemas.openxmlformats.org/officeDocument/2006/relationships" xmlns:p="http://schemas.openxmlformats.org/presentationml/2006/main">
+  <p:cSld>
+    <p:bg>
+      <p:bgRef idx="1001">
+        <a:schemeClr val="bg1"/>
+      </p:bgRef>
+    </p:bg>
+    <p:spTree>
+      <p:nvGrpSpPr>
+        <p:cNvPr id="1" name=""/>
+        <p:cNvGrpSpPr/>
+        <p:nvPr/>
+      </p:nvGrpSpPr>
+      <p:grpSpPr>
+        <a:xfrm>
+          <a:off x="0" y="0"/>
+          <a:ext cx="0" cy="0"/>
+          <a:chOff x="0" y="0"/>
+          <a:chExt cx="0" cy="0"/>
+        </a:xfrm>
+      </p:grpSpPr>
+      <p:sp>
+        <p:nvSpPr>
+          <p:cNvPr id="2" name="Header Placeholder 1"/>
+          <p:cNvSpPr>
+            <a:spLocks noGrp="1"/>
+          </p:cNvSpPr>
+          <p:nvPr>
+            <p:ph type="hdr" sz="quarter"/>
+          </p:nvPr>
+        </p:nvSpPr>
+        <p:spPr>
+          <a:xfrm>
+            <a:off x="0" y="0"/>
+            <a:ext cx="2971800" cy="458788"/>
+          </a:xfrm>
+          <a:prstGeom prst="rect">
+            <a:avLst/>
+          </a:prstGeom>
+        </p:spPr>
+        <p:txBody>
+          <a:bodyPr vert="horz" lIns="91440" tIns="45720" rIns="91440" bIns="45720" rtlCol="0"/>
+          <a:lstStyle>
+            <a:lvl1pPr algn="l">
+              <a:defRPr sz="1200"/>
+            </a:lvl1pPr>
+          </a:lstStyle>
+          <a:p>
+            <a:endParaRPr lang="en-US"/>
+          </a:p>
+        </p:txBody>
+      </p:sp>
+      <p:sp>
+        <p:nvSpPr>
+          <p:cNvPr id="3" name="Date Placeholder 2"/>
+          <p:cNvSpPr>
+            <a:spLocks noGrp="1"/>
+          </p:cNvSpPr>
+          <p:nvPr>
+            <p:ph type="dt" idx="1"/>
+          </p:nvPr>
+        </p:nvSpPr>
+        <p:spPr>
+          <a:xfrm>
+            <a:off x="3884613" y="0"/>
+            <a:ext cx="2971800" cy="458788"/>
+          </a:xfrm>
+          <a:prstGeom prst="rect">
+            <a:avLst/>
+          </a:prstGeom>
+        </p:spPr>
+        <p:txBody>
+          <a:bodyPr vert="horz" lIns="91440" tIns="45720" rIns="91440" bIns="45720" rtlCol="0"/>
+          <a:lstStyle>
+            <a:lvl1pPr algn="r">
+              <a:defRPr sz="1200"/>
+            </a:lvl1pPr>
+          </a:lstStyle>
+          <a:p>
+            <a:fld id="{47C1E5EE-D0C5-4A28-9E5E-7BAED0037C7E}" type="datetimeFigureOut">
+              <a:rPr lang="en-US" smtClean="0"/>
+              <a:t>10/3/2015</a:t>
+            </a:fld>
+            <a:endParaRPr lang="en-US"/>
+          </a:p>
+        </p:txBody>
+      </p:sp>
+      <p:sp>
+        <p:nvSpPr>
+          <p:cNvPr id="4" name="Slide Image Placeholder 3"/>
+          <p:cNvSpPr>
+            <a:spLocks noGrp="1" noRot="1" noChangeAspect="1"/>
+          </p:cNvSpPr>
+          <p:nvPr>
+            <p:ph type="sldImg" idx="2"/>
+          </p:nvPr>
+        </p:nvSpPr>
+        <p:spPr>
+          <a:xfrm>
+            <a:off x="685800" y="1143000"/>
+            <a:ext cx="5486400" cy="3086100"/>
+          </a:xfrm>
+          <a:prstGeom prst="rect">
+            <a:avLst/>
+          </a:prstGeom>
+          <a:noFill/>
+          <a:ln w="12700">
+            <a:solidFill>
+              <a:prstClr val="black"/>
+            </a:solidFill>
+          </a:ln>
+        </p:spPr>
+        <p:txBody>
+          <a:bodyPr vert="horz" lIns="91440" tIns="45720" rIns="91440" bIns="45720" rtlCol="0" anchor="ctr"/>
+          <a:lstStyle/>
+          <a:p>
+            <a:endParaRPr lang="en-US"/>
+          </a:p>
+        </p:txBody>
+      </p:sp>
+      <p:sp>
+        <p:nvSpPr>
+          <p:cNvPr id="5" name="Notes Placeholder 4"/>
+          <p:cNvSpPr>
+            <a:spLocks noGrp="1"/>
+          </p:cNvSpPr>
+          <p:nvPr>
+            <p:ph type="body" sz="quarter" idx="3"/>
+          </p:nvPr>
+        </p:nvSpPr>
+        <p:spPr>
+          <a:xfrm>
+            <a:off x="685800" y="4400550"/>
+            <a:ext cx="5486400" cy="3600450"/>
+          </a:xfrm>
+          <a:prstGeom prst="rect">
+            <a:avLst/>
+          </a:prstGeom>
+        </p:spPr>
+        <p:txBody>
+          <a:bodyPr vert="horz" lIns="91440" tIns="45720" rIns="91440" bIns="45720" rtlCol="0"/>
+          <a:lstStyle/>
+          <a:p>
+            <a:pPr lvl="0"/>
+            <a:r>
+              <a:rPr lang="en-US" smtClean="0"/>
+              <a:t>Click to edit Master text styles</a:t>
+            </a:r>
+          </a:p>
+          <a:p>
+            <a:pPr lvl="1"/>
+            <a:r>
+              <a:rPr lang="en-US" smtClean="0"/>
+              <a:t>Second level</a:t>
+            </a:r>
+          </a:p>
+          <a:p>
+            <a:pPr lvl="2"/>
+            <a:r>
+              <a:rPr lang="en-US" smtClean="0"/>
+              <a:t>Third level</a:t>
+            </a:r>
+          </a:p>
+          <a:p>
+            <a:pPr lvl="3"/>
+            <a:r>
+              <a:rPr lang="en-US" smtClean="0"/>
+              <a:t>Fourth level</a:t>
+            </a:r>
+          </a:p>
+          <a:p>
+            <a:pPr lvl="4"/>
+            <a:r>
+              <a:rPr lang="en-US" smtClean="0"/>
+              <a:t>Fifth level</a:t>
+            </a:r>
+            <a:endParaRPr lang="en-US"/>
+          </a:p>
+        </p:txBody>
+      </p:sp>
+      <p:sp>
+        <p:nvSpPr>
+          <p:cNvPr id="6" name="Footer Placeholder 5"/>
+          <p:cNvSpPr>
+            <a:spLocks noGrp="1"/>
+          </p:cNvSpPr>
+          <p:nvPr>
+            <p:ph type="ftr" sz="quarter" idx="4"/>
+          </p:nvPr>
+        </p:nvSpPr>
+        <p:spPr>
+          <a:xfrm>
+            <a:off x="0" y="8685213"/>
+            <a:ext cx="2971800" cy="458787"/>
+          </a:xfrm>
+          <a:prstGeom prst="rect">
+            <a:avLst/>
+          </a:prstGeom>
+        </p:spPr>
+        <p:txBody>
+          <a:bodyPr vert="horz" lIns="91440" tIns="45720" rIns="91440" bIns="45720" rtlCol="0" anchor="b"/>
+          <a:lstStyle>
+            <a:lvl1pPr algn="l">
+              <a:defRPr sz="1200"/>
+            </a:lvl1pPr>
+          </a:lstStyle>
+          <a:p>
+            <a:endParaRPr lang="en-US"/>
+          </a:p>
+        </p:txBody>
+      </p:sp>
+      <p:sp>
+        <p:nvSpPr>
+          <p:cNvPr id="7" name="Slide Number Placeholder 6"/>
+          <p:cNvSpPr>
+            <a:spLocks noGrp="1"/>
+          </p:cNvSpPr>
+          <p:nvPr>
+            <p:ph type="sldNum" sz="quarter" idx="5"/>
+          </p:nvPr>
+        </p:nvSpPr>
+        <p:spPr>
+          <a:xfrm>
+            <a:off x="3884613" y="8685213"/>
+            <a:ext cx="2971800" cy="458787"/>
+          </a:xfrm>
+          <a:prstGeom prst="rect">
+            <a:avLst/>
+          </a:prstGeom>
+        </p:spPr>
+        <p:txBody>
+          <a:bodyPr vert="horz" lIns="91440" tIns="45720" rIns="91440" bIns="45720" rtlCol="0" anchor="b"/>
+          <a:lstStyle>
+            <a:lvl1pPr algn="r">
+              <a:defRPr sz="1200"/>
+            </a:lvl1pPr>
+          </a:lstStyle>
+          <a:p>
+            <a:fld id="{32413DD5-58EC-46E8-A384-C82E9D4B4846}" type="slidenum">
+              <a:rPr lang="en-US" smtClean="0"/>
+              <a:t>‹#›</a:t>
+            </a:fld>
+            <a:endParaRPr lang="en-US"/>
+          </a:p>
+        </p:txBody>
+      </p:sp>
+    </p:spTree>
+    <p:extLst>
+      <p:ext uri="{BB962C8B-B14F-4D97-AF65-F5344CB8AC3E}">
+        <p14:creationId xmlns:p14="http://schemas.microsoft.com/office/powerpoint/2010/main" val="3326103826"/>
+      </p:ext>
+    </p:extLst>
+  </p:cSld>
+  <p:clrMap bg1="lt1" tx1="dk1" bg2="lt2" tx2="dk2" accent1="accent1" accent2="accent2" accent3="accent3" accent4="accent4" accent5="accent5" accent6="accent6" hlink="hlink" folHlink="folHlink"/>
+  <p:notesStyle>
+    <a:lvl1pPr marL="0" algn="l" defTabSz="914400" rtl="0" eaLnBrk="1" latinLnBrk="0" hangingPunct="1">
+      <a:defRPr sz="1200" kern="1200">
+        <a:solidFill>
+          <a:schemeClr val="tx1"/>
+        </a:solidFill>
+        <a:latin typeface="+mn-lt"/>
+        <a:ea typeface="+mn-ea"/>
+        <a:cs typeface="+mn-cs"/>
+      </a:defRPr>
+    </a:lvl1pPr>
+    <a:lvl2pPr marL="457200" algn="l" defTabSz="914400" rtl="0" eaLnBrk="1" latinLnBrk="0" hangingPunct="1">
+      <a:defRPr sz="1200" kern="1200">
+        <a:solidFill>
+          <a:schemeClr val="tx1"/>
+        </a:solidFill>
+        <a:latin typeface="+mn-lt"/>
+        <a:ea typeface="+mn-ea"/>
+        <a:cs typeface="+mn-cs"/>
+      </a:defRPr>
+    </a:lvl2pPr>
+    <a:lvl3pPr marL="914400" algn="l" defTabSz="914400" rtl="0" eaLnBrk="1" latinLnBrk="0" hangingPunct="1">
+      <a:defRPr sz="1200" kern="1200">
+        <a:solidFill>
+          <a:schemeClr val="tx1"/>
+        </a:solidFill>
+        <a:latin typeface="+mn-lt"/>
+        <a:ea typeface="+mn-ea"/>
+        <a:cs typeface="+mn-cs"/>
+      </a:defRPr>
+    </a:lvl3pPr>
+    <a:lvl4pPr marL="1371600" algn="l" defTabSz="914400" rtl="0" eaLnBrk="1" latinLnBrk="0" hangingPunct="1">
+      <a:defRPr sz="1200" kern="1200">
+        <a:solidFill>
+          <a:schemeClr val="tx1"/>
+        </a:solidFill>
+        <a:latin typeface="+mn-lt"/>
+        <a:ea typeface="+mn-ea"/>
+        <a:cs typeface="+mn-cs"/>
+      </a:defRPr>
+    </a:lvl4pPr>
+    <a:lvl5pPr marL="1828800" algn="l" defTabSz="914400" rtl="0" eaLnBrk="1" latinLnBrk="0" hangingPunct="1">
+      <a:defRPr sz="1200" kern="1200">
+        <a:solidFill>
+          <a:schemeClr val="tx1"/>
+        </a:solidFill>
+        <a:latin typeface="+mn-lt"/>
+        <a:ea typeface="+mn-ea"/>
+        <a:cs typeface="+mn-cs"/>
+      </a:defRPr>
+    </a:lvl5pPr>
+    <a:lvl6pPr marL="2286000" algn="l" defTabSz="914400" rtl="0" eaLnBrk="1" latinLnBrk="0" hangingPunct="1">
+      <a:defRPr sz="1200" kern="1200">
+        <a:solidFill>
+          <a:schemeClr val="tx1"/>
+        </a:solidFill>
+        <a:latin typeface="+mn-lt"/>
+        <a:ea typeface="+mn-ea"/>
+        <a:cs typeface="+mn-cs"/>
+      </a:defRPr>
+    </a:lvl6pPr>
+    <a:lvl7pPr marL="2743200" algn="l" defTabSz="914400" rtl="0" eaLnBrk="1" latinLnBrk="0" hangingPunct="1">
+      <a:defRPr sz="1200" kern="1200">
+        <a:solidFill>
+          <a:schemeClr val="tx1"/>
+        </a:solidFill>
+        <a:latin typeface="+mn-lt"/>
+        <a:ea typeface="+mn-ea"/>
+        <a:cs typeface="+mn-cs"/>
+      </a:defRPr>
+    </a:lvl7pPr>
+    <a:lvl8pPr marL="3200400" algn="l" defTabSz="914400" rtl="0" eaLnBrk="1" latinLnBrk="0" hangingPunct="1">
+      <a:defRPr sz="1200" kern="1200">
+        <a:solidFill>
+          <a:schemeClr val="tx1"/>
+        </a:solidFill>
+        <a:latin typeface="+mn-lt"/>
+        <a:ea typeface="+mn-ea"/>
+        <a:cs typeface="+mn-cs"/>
+      </a:defRPr>
+    </a:lvl8pPr>
+    <a:lvl9pPr marL="3657600" algn="l" defTabSz="914400" rtl="0" eaLnBrk="1" latinLnBrk="0" hangingPunct="1">
+      <a:defRPr sz="1200" kern="1200">
+        <a:solidFill>
+          <a:schemeClr val="tx1"/>
+        </a:solidFill>
+        <a:latin typeface="+mn-lt"/>
+        <a:ea typeface="+mn-ea"/>
+        <a:cs typeface="+mn-cs"/>
+      </a:defRPr>
+    </a:lvl9pPr>
+  </p:notesStyle>
+</p:notesMaster>
+</file>
+
+<file path=ppt/notesSlides/notesSlide1.xml><?xml version="1.0" encoding="utf-8"?>
+<p:notes xmlns:a="http://schemas.openxmlformats.org/drawingml/2006/main" xmlns:r="http://schemas.openxmlformats.org/officeDocument/2006/relationships" xmlns:p="http://schemas.openxmlformats.org/presentationml/2006/main">
+  <p:cSld>
+    <p:spTree>
+      <p:nvGrpSpPr>
+        <p:cNvPr id="1" name=""/>
+        <p:cNvGrpSpPr/>
+        <p:nvPr/>
+      </p:nvGrpSpPr>
+      <p:grpSpPr>
+        <a:xfrm>
+          <a:off x="0" y="0"/>
+          <a:ext cx="0" cy="0"/>
+          <a:chOff x="0" y="0"/>
+          <a:chExt cx="0" cy="0"/>
+        </a:xfrm>
+      </p:grpSpPr>
+      <p:sp>
+        <p:nvSpPr>
+          <p:cNvPr id="2" name="Slide Image Placeholder 1"/>
+          <p:cNvSpPr>
+            <a:spLocks noGrp="1" noRot="1" noChangeAspect="1"/>
+          </p:cNvSpPr>
+          <p:nvPr>
+            <p:ph type="sldImg"/>
+          </p:nvPr>
+        </p:nvSpPr>
+        <p:spPr/>
+      </p:sp>
+      <p:sp>
+        <p:nvSpPr>
+          <p:cNvPr id="3" name="Notes Placeholder 2"/>
+          <p:cNvSpPr>
+            <a:spLocks noGrp="1"/>
+          </p:cNvSpPr>
+          <p:nvPr>
+            <p:ph type="body" idx="1"/>
+          </p:nvPr>
+        </p:nvSpPr>
+        <p:spPr/>
+        <p:txBody>
+          <a:bodyPr/>
+          <a:lstStyle/>
+          <a:p>
+            <a:endParaRPr lang="en-US"/>
+          </a:p>
+        </p:txBody>
+      </p:sp>
+      <p:sp>
+        <p:nvSpPr>
+          <p:cNvPr id="4" name="Slide Number Placeholder 3"/>
+          <p:cNvSpPr>
+            <a:spLocks noGrp="1"/>
+          </p:cNvSpPr>
+          <p:nvPr>
+            <p:ph type="sldNum" sz="quarter" idx="10"/>
+          </p:nvPr>
+        </p:nvSpPr>
+        <p:spPr/>
+        <p:txBody>
+          <a:bodyPr/>
+          <a:lstStyle/>
+          <a:p>
+            <a:fld id="{32413DD5-58EC-46E8-A384-C82E9D4B4846}" type="slidenum">
+              <a:rPr lang="en-US" smtClean="0"/>
+              <a:t>10</a:t>
+            </a:fld>
+            <a:endParaRPr lang="en-US"/>
+          </a:p>
+        </p:txBody>
+      </p:sp>
+    </p:spTree>
+    <p:extLst>
+      <p:ext uri="{BB962C8B-B14F-4D97-AF65-F5344CB8AC3E}">
+        <p14:creationId xmlns:p14="http://schemas.microsoft.com/office/powerpoint/2010/main" val="3395238226"/>
+      </p:ext>
+    </p:extLst>
+  </p:cSld>
+  <p:clrMapOvr>
+    <a:masterClrMapping/>
+  </p:clrMapOvr>
+</p:notes>
+</file>
+
 <file path=ppt/slideLayouts/slideLayout1.xml><?xml version="1.0" encoding="utf-8"?>
 <p:sldLayout xmlns:a="http://schemas.openxmlformats.org/drawingml/2006/main" xmlns:r="http://schemas.openxmlformats.org/officeDocument/2006/relationships" xmlns:p="http://schemas.openxmlformats.org/presentationml/2006/main" type="title" preserve="1">
   <p:cSld name="Title Slide">
@@ -3677,7 +4671,7 @@
           <a:bodyPr/>
           <a:lstStyle/>
           <a:p>
-            <a:fld id="{7F489EFF-3AF9-42EA-BC1A-94C6CDCEDD32}" type="datetimeFigureOut">
+            <a:fld id="{C47C25C1-EA53-4323-8C26-912FC7674A02}" type="datetime1">
               <a:rPr lang="en-US" smtClean="0"/>
               <a:t>10/3/2015</a:t>
             </a:fld>
@@ -3847,7 +4841,7 @@
           <a:bodyPr/>
           <a:lstStyle/>
           <a:p>
-            <a:fld id="{7F489EFF-3AF9-42EA-BC1A-94C6CDCEDD32}" type="datetimeFigureOut">
+            <a:fld id="{7161FDDA-DCF3-44F0-8336-0FA677510F0C}" type="datetime1">
               <a:rPr lang="en-US" smtClean="0"/>
               <a:t>10/3/2015</a:t>
             </a:fld>
@@ -4027,7 +5021,7 @@
           <a:bodyPr/>
           <a:lstStyle/>
           <a:p>
-            <a:fld id="{7F489EFF-3AF9-42EA-BC1A-94C6CDCEDD32}" type="datetimeFigureOut">
+            <a:fld id="{BF0F15BE-1BBB-4D73-9B66-E8C344198415}" type="datetime1">
               <a:rPr lang="en-US" smtClean="0"/>
               <a:t>10/3/2015</a:t>
             </a:fld>
@@ -4197,7 +5191,7 @@
           <a:bodyPr/>
           <a:lstStyle/>
           <a:p>
-            <a:fld id="{7F489EFF-3AF9-42EA-BC1A-94C6CDCEDD32}" type="datetimeFigureOut">
+            <a:fld id="{10D609D9-CBFE-4BF0-9C5A-046D548DB43E}" type="datetime1">
               <a:rPr lang="en-US" smtClean="0"/>
               <a:t>10/3/2015</a:t>
             </a:fld>
@@ -4443,7 +5437,7 @@
           <a:bodyPr/>
           <a:lstStyle/>
           <a:p>
-            <a:fld id="{7F489EFF-3AF9-42EA-BC1A-94C6CDCEDD32}" type="datetimeFigureOut">
+            <a:fld id="{44BFF1C4-082A-4286-8CB5-93ECE29551C3}" type="datetime1">
               <a:rPr lang="en-US" smtClean="0"/>
               <a:t>10/3/2015</a:t>
             </a:fld>
@@ -4675,7 +5669,7 @@
           <a:bodyPr/>
           <a:lstStyle/>
           <a:p>
-            <a:fld id="{7F489EFF-3AF9-42EA-BC1A-94C6CDCEDD32}" type="datetimeFigureOut">
+            <a:fld id="{978562A9-674F-44C5-89FA-43A5181C3EFF}" type="datetime1">
               <a:rPr lang="en-US" smtClean="0"/>
               <a:t>10/3/2015</a:t>
             </a:fld>
@@ -5042,7 +6036,7 @@
           <a:bodyPr/>
           <a:lstStyle/>
           <a:p>
-            <a:fld id="{7F489EFF-3AF9-42EA-BC1A-94C6CDCEDD32}" type="datetimeFigureOut">
+            <a:fld id="{F300F7D3-5F43-4088-8FBF-E0119C8EC16A}" type="datetime1">
               <a:rPr lang="en-US" smtClean="0"/>
               <a:t>10/3/2015</a:t>
             </a:fld>
@@ -5160,7 +6154,7 @@
           <a:bodyPr/>
           <a:lstStyle/>
           <a:p>
-            <a:fld id="{7F489EFF-3AF9-42EA-BC1A-94C6CDCEDD32}" type="datetimeFigureOut">
+            <a:fld id="{8F55FC2A-AF32-4077-8307-9AE2D6EF0675}" type="datetime1">
               <a:rPr lang="en-US" smtClean="0"/>
               <a:t>10/3/2015</a:t>
             </a:fld>
@@ -5255,7 +6249,7 @@
           <a:bodyPr/>
           <a:lstStyle/>
           <a:p>
-            <a:fld id="{7F489EFF-3AF9-42EA-BC1A-94C6CDCEDD32}" type="datetimeFigureOut">
+            <a:fld id="{383C7018-E57A-4BF1-AC03-51A6EF5A0446}" type="datetime1">
               <a:rPr lang="en-US" smtClean="0"/>
               <a:t>10/3/2015</a:t>
             </a:fld>
@@ -5532,7 +6526,7 @@
           <a:bodyPr/>
           <a:lstStyle/>
           <a:p>
-            <a:fld id="{7F489EFF-3AF9-42EA-BC1A-94C6CDCEDD32}" type="datetimeFigureOut">
+            <a:fld id="{1C0483EA-AABE-4562-A193-BE4EB4E53D47}" type="datetime1">
               <a:rPr lang="en-US" smtClean="0"/>
               <a:t>10/3/2015</a:t>
             </a:fld>
@@ -5785,7 +6779,7 @@
           <a:bodyPr/>
           <a:lstStyle/>
           <a:p>
-            <a:fld id="{7F489EFF-3AF9-42EA-BC1A-94C6CDCEDD32}" type="datetimeFigureOut">
+            <a:fld id="{DC0CDF06-2C1F-4455-91EE-EF465A6E032F}" type="datetime1">
               <a:rPr lang="en-US" smtClean="0"/>
               <a:t>10/3/2015</a:t>
             </a:fld>
@@ -5998,7 +6992,7 @@
             </a:lvl1pPr>
           </a:lstStyle>
           <a:p>
-            <a:fld id="{7F489EFF-3AF9-42EA-BC1A-94C6CDCEDD32}" type="datetimeFigureOut">
+            <a:fld id="{FFFD2C95-EF8A-4176-B468-A3530E12C41B}" type="datetime1">
               <a:rPr lang="en-US" smtClean="0"/>
               <a:t>10/3/2015</a:t>
             </a:fld>
@@ -6105,6 +7099,7 @@
     <p:sldLayoutId id="2147483658" r:id="rId10"/>
     <p:sldLayoutId id="2147483659" r:id="rId11"/>
   </p:sldLayoutIdLst>
+  <p:hf hdr="0" ftr="0" dt="0"/>
   <p:txStyles>
     <p:titleStyle>
       <a:lvl1pPr algn="l" defTabSz="914400" rtl="0" eaLnBrk="1" latinLnBrk="0" hangingPunct="1">
@@ -6492,6 +7487,29 @@
           </a:p>
         </p:txBody>
       </p:sp>
+      <p:sp>
+        <p:nvSpPr>
+          <p:cNvPr id="3" name="Slide Number Placeholder 2"/>
+          <p:cNvSpPr>
+            <a:spLocks noGrp="1"/>
+          </p:cNvSpPr>
+          <p:nvPr>
+            <p:ph type="sldNum" sz="quarter" idx="12"/>
+          </p:nvPr>
+        </p:nvSpPr>
+        <p:spPr/>
+        <p:txBody>
+          <a:bodyPr/>
+          <a:lstStyle/>
+          <a:p>
+            <a:fld id="{1F51628B-B711-4D44-8D35-0F575EAEB34E}" type="slidenum">
+              <a:rPr lang="en-US" smtClean="0"/>
+              <a:t>1</a:t>
+            </a:fld>
+            <a:endParaRPr lang="en-US"/>
+          </a:p>
+        </p:txBody>
+      </p:sp>
     </p:spTree>
     <p:extLst>
       <p:ext uri="{BB962C8B-B14F-4D97-AF65-F5344CB8AC3E}">
@@ -6568,26 +7586,51 @@
       </p:sp>
       <p:pic>
         <p:nvPicPr>
-          <p:cNvPr id="12" name="Picture 11"/>
-          <p:cNvPicPr/>
+          <p:cNvPr id="2" name="Picture 1"/>
+          <p:cNvPicPr>
+            <a:picLocks noChangeAspect="1"/>
+          </p:cNvPicPr>
           <p:nvPr/>
         </p:nvPicPr>
         <p:blipFill>
-          <a:blip r:embed="rId2"/>
+          <a:blip r:embed="rId3"/>
           <a:stretch>
             <a:fillRect/>
           </a:stretch>
         </p:blipFill>
         <p:spPr>
           <a:xfrm>
-            <a:off x="2106233" y="866403"/>
-            <a:ext cx="7333981" cy="5543580"/>
+            <a:off x="2595848" y="923672"/>
+            <a:ext cx="7026062" cy="5010656"/>
           </a:xfrm>
           <a:prstGeom prst="rect">
             <a:avLst/>
           </a:prstGeom>
         </p:spPr>
       </p:pic>
+      <p:sp>
+        <p:nvSpPr>
+          <p:cNvPr id="3" name="Slide Number Placeholder 2"/>
+          <p:cNvSpPr>
+            <a:spLocks noGrp="1"/>
+          </p:cNvSpPr>
+          <p:nvPr>
+            <p:ph type="sldNum" sz="quarter" idx="12"/>
+          </p:nvPr>
+        </p:nvSpPr>
+        <p:spPr/>
+        <p:txBody>
+          <a:bodyPr/>
+          <a:lstStyle/>
+          <a:p>
+            <a:fld id="{1F51628B-B711-4D44-8D35-0F575EAEB34E}" type="slidenum">
+              <a:rPr lang="en-US" smtClean="0"/>
+              <a:t>10</a:t>
+            </a:fld>
+            <a:endParaRPr lang="en-US"/>
+          </a:p>
+        </p:txBody>
+      </p:sp>
     </p:spTree>
     <p:extLst>
       <p:ext uri="{BB962C8B-B14F-4D97-AF65-F5344CB8AC3E}">
@@ -6730,6 +7773,29 @@
           </a:p>
         </p:txBody>
       </p:sp>
+      <p:sp>
+        <p:nvSpPr>
+          <p:cNvPr id="3" name="Slide Number Placeholder 2"/>
+          <p:cNvSpPr>
+            <a:spLocks noGrp="1"/>
+          </p:cNvSpPr>
+          <p:nvPr>
+            <p:ph type="sldNum" sz="quarter" idx="12"/>
+          </p:nvPr>
+        </p:nvSpPr>
+        <p:spPr/>
+        <p:txBody>
+          <a:bodyPr/>
+          <a:lstStyle/>
+          <a:p>
+            <a:fld id="{1F51628B-B711-4D44-8D35-0F575EAEB34E}" type="slidenum">
+              <a:rPr lang="en-US" smtClean="0"/>
+              <a:t>11</a:t>
+            </a:fld>
+            <a:endParaRPr lang="en-US"/>
+          </a:p>
+        </p:txBody>
+      </p:sp>
     </p:spTree>
     <p:extLst>
       <p:ext uri="{BB962C8B-B14F-4D97-AF65-F5344CB8AC3E}">
@@ -6870,6 +7936,29 @@
           </a:prstGeom>
         </p:spPr>
       </p:pic>
+      <p:sp>
+        <p:nvSpPr>
+          <p:cNvPr id="3" name="Slide Number Placeholder 2"/>
+          <p:cNvSpPr>
+            <a:spLocks noGrp="1"/>
+          </p:cNvSpPr>
+          <p:nvPr>
+            <p:ph type="sldNum" sz="quarter" idx="12"/>
+          </p:nvPr>
+        </p:nvSpPr>
+        <p:spPr/>
+        <p:txBody>
+          <a:bodyPr/>
+          <a:lstStyle/>
+          <a:p>
+            <a:fld id="{1F51628B-B711-4D44-8D35-0F575EAEB34E}" type="slidenum">
+              <a:rPr lang="en-US" smtClean="0"/>
+              <a:t>12</a:t>
+            </a:fld>
+            <a:endParaRPr lang="en-US"/>
+          </a:p>
+        </p:txBody>
+      </p:sp>
     </p:spTree>
     <p:extLst>
       <p:ext uri="{BB962C8B-B14F-4D97-AF65-F5344CB8AC3E}">
@@ -7002,6 +8091,29 @@
           </a:prstGeom>
         </p:spPr>
       </p:pic>
+      <p:sp>
+        <p:nvSpPr>
+          <p:cNvPr id="3" name="Slide Number Placeholder 2"/>
+          <p:cNvSpPr>
+            <a:spLocks noGrp="1"/>
+          </p:cNvSpPr>
+          <p:nvPr>
+            <p:ph type="sldNum" sz="quarter" idx="12"/>
+          </p:nvPr>
+        </p:nvSpPr>
+        <p:spPr/>
+        <p:txBody>
+          <a:bodyPr/>
+          <a:lstStyle/>
+          <a:p>
+            <a:fld id="{1F51628B-B711-4D44-8D35-0F575EAEB34E}" type="slidenum">
+              <a:rPr lang="en-US" smtClean="0"/>
+              <a:t>13</a:t>
+            </a:fld>
+            <a:endParaRPr lang="en-US"/>
+          </a:p>
+        </p:txBody>
+      </p:sp>
     </p:spTree>
     <p:extLst>
       <p:ext uri="{BB962C8B-B14F-4D97-AF65-F5344CB8AC3E}">
@@ -7138,6 +8250,29 @@
           </a:prstGeom>
         </p:spPr>
       </p:pic>
+      <p:sp>
+        <p:nvSpPr>
+          <p:cNvPr id="3" name="Slide Number Placeholder 2"/>
+          <p:cNvSpPr>
+            <a:spLocks noGrp="1"/>
+          </p:cNvSpPr>
+          <p:nvPr>
+            <p:ph type="sldNum" sz="quarter" idx="12"/>
+          </p:nvPr>
+        </p:nvSpPr>
+        <p:spPr/>
+        <p:txBody>
+          <a:bodyPr/>
+          <a:lstStyle/>
+          <a:p>
+            <a:fld id="{1F51628B-B711-4D44-8D35-0F575EAEB34E}" type="slidenum">
+              <a:rPr lang="en-US" smtClean="0"/>
+              <a:t>14</a:t>
+            </a:fld>
+            <a:endParaRPr lang="en-US"/>
+          </a:p>
+        </p:txBody>
+      </p:sp>
     </p:spTree>
     <p:extLst>
       <p:ext uri="{BB962C8B-B14F-4D97-AF65-F5344CB8AC3E}">
@@ -7272,6 +8407,29 @@
           </a:prstGeom>
         </p:spPr>
       </p:pic>
+      <p:sp>
+        <p:nvSpPr>
+          <p:cNvPr id="3" name="Slide Number Placeholder 2"/>
+          <p:cNvSpPr>
+            <a:spLocks noGrp="1"/>
+          </p:cNvSpPr>
+          <p:nvPr>
+            <p:ph type="sldNum" sz="quarter" idx="12"/>
+          </p:nvPr>
+        </p:nvSpPr>
+        <p:spPr/>
+        <p:txBody>
+          <a:bodyPr/>
+          <a:lstStyle/>
+          <a:p>
+            <a:fld id="{1F51628B-B711-4D44-8D35-0F575EAEB34E}" type="slidenum">
+              <a:rPr lang="en-US" smtClean="0"/>
+              <a:t>15</a:t>
+            </a:fld>
+            <a:endParaRPr lang="en-US"/>
+          </a:p>
+        </p:txBody>
+      </p:sp>
     </p:spTree>
     <p:extLst>
       <p:ext uri="{BB962C8B-B14F-4D97-AF65-F5344CB8AC3E}">
@@ -7364,6 +8522,29 @@
           </a:xfrm>
         </p:spPr>
       </p:pic>
+      <p:sp>
+        <p:nvSpPr>
+          <p:cNvPr id="3" name="Slide Number Placeholder 2"/>
+          <p:cNvSpPr>
+            <a:spLocks noGrp="1"/>
+          </p:cNvSpPr>
+          <p:nvPr>
+            <p:ph type="sldNum" sz="quarter" idx="12"/>
+          </p:nvPr>
+        </p:nvSpPr>
+        <p:spPr/>
+        <p:txBody>
+          <a:bodyPr/>
+          <a:lstStyle/>
+          <a:p>
+            <a:fld id="{1F51628B-B711-4D44-8D35-0F575EAEB34E}" type="slidenum">
+              <a:rPr lang="en-US" smtClean="0"/>
+              <a:t>16</a:t>
+            </a:fld>
+            <a:endParaRPr lang="en-US"/>
+          </a:p>
+        </p:txBody>
+      </p:sp>
     </p:spTree>
     <p:extLst>
       <p:ext uri="{BB962C8B-B14F-4D97-AF65-F5344CB8AC3E}">
@@ -7473,6 +8654,29 @@
           </a:graphicData>
         </a:graphic>
       </p:graphicFrame>
+      <p:sp>
+        <p:nvSpPr>
+          <p:cNvPr id="3" name="Slide Number Placeholder 2"/>
+          <p:cNvSpPr>
+            <a:spLocks noGrp="1"/>
+          </p:cNvSpPr>
+          <p:nvPr>
+            <p:ph type="sldNum" sz="quarter" idx="12"/>
+          </p:nvPr>
+        </p:nvSpPr>
+        <p:spPr/>
+        <p:txBody>
+          <a:bodyPr/>
+          <a:lstStyle/>
+          <a:p>
+            <a:fld id="{1F51628B-B711-4D44-8D35-0F575EAEB34E}" type="slidenum">
+              <a:rPr lang="en-US" smtClean="0"/>
+              <a:t>2</a:t>
+            </a:fld>
+            <a:endParaRPr lang="en-US"/>
+          </a:p>
+        </p:txBody>
+      </p:sp>
     </p:spTree>
     <p:extLst>
       <p:ext uri="{BB962C8B-B14F-4D97-AF65-F5344CB8AC3E}">
@@ -7606,6 +8810,29 @@
           </a:prstGeom>
         </p:spPr>
       </p:pic>
+      <p:sp>
+        <p:nvSpPr>
+          <p:cNvPr id="2" name="Slide Number Placeholder 1"/>
+          <p:cNvSpPr>
+            <a:spLocks noGrp="1"/>
+          </p:cNvSpPr>
+          <p:nvPr>
+            <p:ph type="sldNum" sz="quarter" idx="12"/>
+          </p:nvPr>
+        </p:nvSpPr>
+        <p:spPr/>
+        <p:txBody>
+          <a:bodyPr/>
+          <a:lstStyle/>
+          <a:p>
+            <a:fld id="{1F51628B-B711-4D44-8D35-0F575EAEB34E}" type="slidenum">
+              <a:rPr lang="en-US" smtClean="0"/>
+              <a:t>3</a:t>
+            </a:fld>
+            <a:endParaRPr lang="en-US"/>
+          </a:p>
+        </p:txBody>
+      </p:sp>
     </p:spTree>
     <p:extLst>
       <p:ext uri="{BB962C8B-B14F-4D97-AF65-F5344CB8AC3E}">
@@ -7991,8 +9218,8 @@
         </p:nvSpPr>
         <p:spPr>
           <a:xfrm>
-            <a:off x="3275521" y="6198600"/>
-            <a:ext cx="1218603" cy="461665"/>
+            <a:off x="2671032" y="6198600"/>
+            <a:ext cx="2427588" cy="461665"/>
           </a:xfrm>
           <a:prstGeom prst="rect">
             <a:avLst/>
@@ -8007,7 +9234,7 @@
           <a:p>
             <a:pPr algn="ctr"/>
             <a:r>
-              <a:rPr lang="en-US" sz="2400" smtClean="0">
+              <a:rPr lang="en-US" sz="2400" dirty="0" err="1" smtClean="0">
                 <a:ln w="0"/>
                 <a:solidFill>
                   <a:schemeClr val="accent1"/>
@@ -8020,9 +9247,105 @@
                   </a:outerShdw>
                 </a:effectLst>
               </a:rPr>
-              <a:t>Hậu mãi</a:t>
-            </a:r>
-            <a:endParaRPr lang="en-US" sz="2400" b="0" cap="none" spc="0">
+              <a:t>Huỷ</a:t>
+            </a:r>
+            <a:r>
+              <a:rPr lang="en-US" sz="2400" dirty="0" smtClean="0">
+                <a:ln w="0"/>
+                <a:solidFill>
+                  <a:schemeClr val="accent1"/>
+                </a:solidFill>
+                <a:effectLst>
+                  <a:outerShdw blurRad="38100" dist="25400" dir="5400000" algn="ctr" rotWithShape="0">
+                    <a:srgbClr val="6E747A">
+                      <a:alpha val="43000"/>
+                    </a:srgbClr>
+                  </a:outerShdw>
+                </a:effectLst>
+              </a:rPr>
+              <a:t> </a:t>
+            </a:r>
+            <a:r>
+              <a:rPr lang="en-US" sz="2400" dirty="0" err="1" smtClean="0">
+                <a:ln w="0"/>
+                <a:solidFill>
+                  <a:schemeClr val="accent1"/>
+                </a:solidFill>
+                <a:effectLst>
+                  <a:outerShdw blurRad="38100" dist="25400" dir="5400000" algn="ctr" rotWithShape="0">
+                    <a:srgbClr val="6E747A">
+                      <a:alpha val="43000"/>
+                    </a:srgbClr>
+                  </a:outerShdw>
+                </a:effectLst>
+              </a:rPr>
+              <a:t>đơn</a:t>
+            </a:r>
+            <a:r>
+              <a:rPr lang="en-US" sz="2400" dirty="0" smtClean="0">
+                <a:ln w="0"/>
+                <a:solidFill>
+                  <a:schemeClr val="accent1"/>
+                </a:solidFill>
+                <a:effectLst>
+                  <a:outerShdw blurRad="38100" dist="25400" dir="5400000" algn="ctr" rotWithShape="0">
+                    <a:srgbClr val="6E747A">
+                      <a:alpha val="43000"/>
+                    </a:srgbClr>
+                  </a:outerShdw>
+                </a:effectLst>
+              </a:rPr>
+              <a:t> </a:t>
+            </a:r>
+            <a:r>
+              <a:rPr lang="en-US" sz="2400" dirty="0" err="1" smtClean="0">
+                <a:ln w="0"/>
+                <a:solidFill>
+                  <a:schemeClr val="accent1"/>
+                </a:solidFill>
+                <a:effectLst>
+                  <a:outerShdw blurRad="38100" dist="25400" dir="5400000" algn="ctr" rotWithShape="0">
+                    <a:srgbClr val="6E747A">
+                      <a:alpha val="43000"/>
+                    </a:srgbClr>
+                  </a:outerShdw>
+                </a:effectLst>
+              </a:rPr>
+              <a:t>đặt</a:t>
+            </a:r>
+            <a:r>
+              <a:rPr lang="en-US" sz="2400" dirty="0" smtClean="0">
+                <a:ln w="0"/>
+                <a:solidFill>
+                  <a:schemeClr val="accent1"/>
+                </a:solidFill>
+                <a:effectLst>
+                  <a:outerShdw blurRad="38100" dist="25400" dir="5400000" algn="ctr" rotWithShape="0">
+                    <a:srgbClr val="6E747A">
+                      <a:alpha val="43000"/>
+                    </a:srgbClr>
+                  </a:outerShdw>
+                </a:effectLst>
+              </a:rPr>
+              <a:t> </a:t>
+            </a:r>
+            <a:r>
+              <a:rPr lang="en-US" sz="2400" dirty="0" err="1" smtClean="0">
+                <a:ln w="0"/>
+                <a:solidFill>
+                  <a:schemeClr val="accent1"/>
+                </a:solidFill>
+                <a:effectLst>
+                  <a:outerShdw blurRad="38100" dist="25400" dir="5400000" algn="ctr" rotWithShape="0">
+                    <a:srgbClr val="6E747A">
+                      <a:alpha val="43000"/>
+                    </a:srgbClr>
+                  </a:outerShdw>
+                </a:effectLst>
+              </a:rPr>
+              <a:t>hàng</a:t>
+            </a:r>
+            <a:endParaRPr lang="en-US" sz="2400" b="0" cap="none" spc="0" dirty="0">
               <a:ln w="0"/>
               <a:solidFill>
                 <a:schemeClr val="accent1"/>
@@ -8120,6 +9443,29 @@
                 </a:outerShdw>
               </a:effectLst>
             </a:endParaRPr>
+          </a:p>
+        </p:txBody>
+      </p:sp>
+      <p:sp>
+        <p:nvSpPr>
+          <p:cNvPr id="3" name="Slide Number Placeholder 2"/>
+          <p:cNvSpPr>
+            <a:spLocks noGrp="1"/>
+          </p:cNvSpPr>
+          <p:nvPr>
+            <p:ph type="sldNum" sz="quarter" idx="12"/>
+          </p:nvPr>
+        </p:nvSpPr>
+        <p:spPr/>
+        <p:txBody>
+          <a:bodyPr/>
+          <a:lstStyle/>
+          <a:p>
+            <a:fld id="{1F51628B-B711-4D44-8D35-0F575EAEB34E}" type="slidenum">
+              <a:rPr lang="en-US" smtClean="0"/>
+              <a:t>4</a:t>
+            </a:fld>
+            <a:endParaRPr lang="en-US"/>
           </a:p>
         </p:txBody>
       </p:sp>
@@ -8623,6 +9969,29 @@
           </a:p>
         </p:txBody>
       </p:sp>
+      <p:sp>
+        <p:nvSpPr>
+          <p:cNvPr id="4" name="Slide Number Placeholder 3"/>
+          <p:cNvSpPr>
+            <a:spLocks noGrp="1"/>
+          </p:cNvSpPr>
+          <p:nvPr>
+            <p:ph type="sldNum" sz="quarter" idx="12"/>
+          </p:nvPr>
+        </p:nvSpPr>
+        <p:spPr/>
+        <p:txBody>
+          <a:bodyPr/>
+          <a:lstStyle/>
+          <a:p>
+            <a:fld id="{1F51628B-B711-4D44-8D35-0F575EAEB34E}" type="slidenum">
+              <a:rPr lang="en-US" smtClean="0"/>
+              <a:t>5</a:t>
+            </a:fld>
+            <a:endParaRPr lang="en-US"/>
+          </a:p>
+        </p:txBody>
+      </p:sp>
     </p:spTree>
     <p:extLst>
       <p:ext uri="{BB962C8B-B14F-4D97-AF65-F5344CB8AC3E}">
@@ -8757,6 +10126,29 @@
           </a:p>
         </p:txBody>
       </p:sp>
+      <p:sp>
+        <p:nvSpPr>
+          <p:cNvPr id="4" name="Slide Number Placeholder 3"/>
+          <p:cNvSpPr>
+            <a:spLocks noGrp="1"/>
+          </p:cNvSpPr>
+          <p:nvPr>
+            <p:ph type="sldNum" sz="quarter" idx="12"/>
+          </p:nvPr>
+        </p:nvSpPr>
+        <p:spPr/>
+        <p:txBody>
+          <a:bodyPr/>
+          <a:lstStyle/>
+          <a:p>
+            <a:fld id="{1F51628B-B711-4D44-8D35-0F575EAEB34E}" type="slidenum">
+              <a:rPr lang="en-US" smtClean="0"/>
+              <a:t>6</a:t>
+            </a:fld>
+            <a:endParaRPr lang="en-US"/>
+          </a:p>
+        </p:txBody>
+      </p:sp>
     </p:spTree>
     <p:extLst>
       <p:ext uri="{BB962C8B-B14F-4D97-AF65-F5344CB8AC3E}">
@@ -8868,6 +10260,29 @@
           </a:p>
         </p:txBody>
       </p:sp>
+      <p:sp>
+        <p:nvSpPr>
+          <p:cNvPr id="4" name="Slide Number Placeholder 3"/>
+          <p:cNvSpPr>
+            <a:spLocks noGrp="1"/>
+          </p:cNvSpPr>
+          <p:nvPr>
+            <p:ph type="sldNum" sz="quarter" idx="12"/>
+          </p:nvPr>
+        </p:nvSpPr>
+        <p:spPr/>
+        <p:txBody>
+          <a:bodyPr/>
+          <a:lstStyle/>
+          <a:p>
+            <a:fld id="{1F51628B-B711-4D44-8D35-0F575EAEB34E}" type="slidenum">
+              <a:rPr lang="en-US" smtClean="0"/>
+              <a:t>7</a:t>
+            </a:fld>
+            <a:endParaRPr lang="en-US"/>
+          </a:p>
+        </p:txBody>
+      </p:sp>
     </p:spTree>
     <p:extLst>
       <p:ext uri="{BB962C8B-B14F-4D97-AF65-F5344CB8AC3E}">
@@ -8927,18 +10342,70 @@
           <a:p>
             <a:pPr algn="ctr"/>
             <a:r>
-              <a:rPr lang="en-US" b="1" smtClean="0">
+              <a:rPr lang="en-US" b="1" dirty="0" err="1" smtClean="0">
                 <a:solidFill>
                   <a:srgbClr val="FF3399"/>
                 </a:solidFill>
               </a:rPr>
-              <a:t>Nghiệp vụ:</a:t>
-            </a:r>
-            <a:r>
-              <a:rPr lang="en-US" b="1" smtClean="0"/>
-              <a:t> Hậu mãi</a:t>
-            </a:r>
-            <a:endParaRPr lang="en-US"/>
+              <a:t>Nghiệp</a:t>
+            </a:r>
+            <a:r>
+              <a:rPr lang="en-US" b="1" dirty="0" smtClean="0">
+                <a:solidFill>
+                  <a:srgbClr val="FF3399"/>
+                </a:solidFill>
+              </a:rPr>
+              <a:t> </a:t>
+            </a:r>
+            <a:r>
+              <a:rPr lang="en-US" b="1" dirty="0" err="1" smtClean="0">
+                <a:solidFill>
+                  <a:srgbClr val="FF3399"/>
+                </a:solidFill>
+              </a:rPr>
+              <a:t>vụ</a:t>
+            </a:r>
+            <a:r>
+              <a:rPr lang="en-US" b="1" dirty="0" smtClean="0">
+                <a:solidFill>
+                  <a:srgbClr val="FF3399"/>
+                </a:solidFill>
+              </a:rPr>
+              <a:t>:</a:t>
+            </a:r>
+            <a:r>
+              <a:rPr lang="en-US" b="1" dirty="0" smtClean="0"/>
+              <a:t> </a:t>
+            </a:r>
+            <a:r>
+              <a:rPr lang="en-US" b="1" dirty="0" err="1" smtClean="0"/>
+              <a:t>Huỷ</a:t>
+            </a:r>
+            <a:r>
+              <a:rPr lang="en-US" b="1" dirty="0" smtClean="0"/>
+              <a:t> </a:t>
+            </a:r>
+            <a:r>
+              <a:rPr lang="en-US" b="1" dirty="0" err="1" smtClean="0"/>
+              <a:t>đơn</a:t>
+            </a:r>
+            <a:r>
+              <a:rPr lang="en-US" b="1" dirty="0" smtClean="0"/>
+              <a:t> </a:t>
+            </a:r>
+            <a:r>
+              <a:rPr lang="en-US" b="1" dirty="0" err="1" smtClean="0"/>
+              <a:t>đặt</a:t>
+            </a:r>
+            <a:r>
+              <a:rPr lang="en-US" b="1" dirty="0" smtClean="0"/>
+              <a:t> </a:t>
+            </a:r>
+            <a:r>
+              <a:rPr lang="en-US" b="1" dirty="0" err="1" smtClean="0"/>
+              <a:t>hàng</a:t>
+            </a:r>
+            <a:endParaRPr lang="en-US" dirty="0"/>
           </a:p>
         </p:txBody>
       </p:sp>
@@ -8976,6 +10443,29 @@
               <a:rPr lang="en-US"/>
               <a:t>Nếu sản phẩm có lỗi thì khách hàng có thể đổi trả. Để đổi trả khách hàng gửi sản phẩm kèm theo đơn đặt hàng bằng chuyển phát. Nhân viên tiến hàng kiểm tra sản phẩm xem có bị lỗi như khách hàng mô tả hay không và sản phẩm có còn nguyên vẹn hay không. Nếu không thì tiến hành gửi trả lại cho khách hàng và thông báo không thể đổi trả được. Nếu có thì sẽ gửi trả sản phẩm mới cho khách hàng và mọi chi phí đổi trả sẽ do công ty chi trả. Khách hàng chỉ có thể đổi trả trong vòng 24h kể từ khi nhận sản phẩm.</a:t>
             </a:r>
+          </a:p>
+        </p:txBody>
+      </p:sp>
+      <p:sp>
+        <p:nvSpPr>
+          <p:cNvPr id="4" name="Slide Number Placeholder 3"/>
+          <p:cNvSpPr>
+            <a:spLocks noGrp="1"/>
+          </p:cNvSpPr>
+          <p:nvPr>
+            <p:ph type="sldNum" sz="quarter" idx="12"/>
+          </p:nvPr>
+        </p:nvSpPr>
+        <p:spPr/>
+        <p:txBody>
+          <a:bodyPr/>
+          <a:lstStyle/>
+          <a:p>
+            <a:fld id="{1F51628B-B711-4D44-8D35-0F575EAEB34E}" type="slidenum">
+              <a:rPr lang="en-US" smtClean="0"/>
+              <a:t>8</a:t>
+            </a:fld>
+            <a:endParaRPr lang="en-US"/>
           </a:p>
         </p:txBody>
       </p:sp>
@@ -9087,6 +10577,29 @@
               <a:rPr lang="en-US"/>
               <a:t>Khi có các chương trình khuyến mãi, giảm giá nhân viên sẽ cập nhật thông tin và đăng bài thông báo lên website.</a:t>
             </a:r>
+          </a:p>
+        </p:txBody>
+      </p:sp>
+      <p:sp>
+        <p:nvSpPr>
+          <p:cNvPr id="4" name="Slide Number Placeholder 3"/>
+          <p:cNvSpPr>
+            <a:spLocks noGrp="1"/>
+          </p:cNvSpPr>
+          <p:nvPr>
+            <p:ph type="sldNum" sz="quarter" idx="12"/>
+          </p:nvPr>
+        </p:nvSpPr>
+        <p:spPr/>
+        <p:txBody>
+          <a:bodyPr/>
+          <a:lstStyle/>
+          <a:p>
+            <a:fld id="{1F51628B-B711-4D44-8D35-0F575EAEB34E}" type="slidenum">
+              <a:rPr lang="en-US" smtClean="0"/>
+              <a:t>9</a:t>
+            </a:fld>
+            <a:endParaRPr lang="en-US"/>
           </a:p>
         </p:txBody>
       </p:sp>
@@ -9369,4 +10882,265 @@
     </a:ext>
   </a:extLst>
 </a:theme>
+</file>
+
+<file path=ppt/theme/theme2.xml><?xml version="1.0" encoding="utf-8"?>
+<a:theme xmlns:a="http://schemas.openxmlformats.org/drawingml/2006/main" name="Office Theme">
+  <a:themeElements>
+    <a:clrScheme name="Office">
+      <a:dk1>
+        <a:sysClr val="windowText" lastClr="000000"/>
+      </a:dk1>
+      <a:lt1>
+        <a:sysClr val="window" lastClr="FFFFFF"/>
+      </a:lt1>
+      <a:dk2>
+        <a:srgbClr val="44546A"/>
+      </a:dk2>
+      <a:lt2>
+        <a:srgbClr val="E7E6E6"/>
+      </a:lt2>
+      <a:accent1>
+        <a:srgbClr val="5B9BD5"/>
+      </a:accent1>
+      <a:accent2>
+        <a:srgbClr val="ED7D31"/>
+      </a:accent2>
+      <a:accent3>
+        <a:srgbClr val="A5A5A5"/>
+      </a:accent3>
+      <a:accent4>
+        <a:srgbClr val="FFC000"/>
+      </a:accent4>
+      <a:accent5>
+        <a:srgbClr val="4472C4"/>
+      </a:accent5>
+      <a:accent6>
+        <a:srgbClr val="70AD47"/>
+      </a:accent6>
+      <a:hlink>
+        <a:srgbClr val="0563C1"/>
+      </a:hlink>
+      <a:folHlink>
+        <a:srgbClr val="954F72"/>
+      </a:folHlink>
+    </a:clrScheme>
+    <a:fontScheme name="Office">
+      <a:majorFont>
+        <a:latin typeface="Calibri Light" panose="020F0302020204030204"/>
+        <a:ea typeface=""/>
+        <a:cs typeface=""/>
+        <a:font script="Jpan" typeface="ＭＳ Ｐゴシック"/>
+        <a:font script="Hang" typeface="맑은 고딕"/>
+        <a:font script="Hans" typeface="宋体"/>
+        <a:font script="Hant" typeface="新細明體"/>
+        <a:font script="Arab" typeface="Times New Roman"/>
+        <a:font script="Hebr" typeface="Times New Roman"/>
+        <a:font script="Thai" typeface="Angsana New"/>
+        <a:font script="Ethi" typeface="Nyala"/>
+        <a:font script="Beng" typeface="Vrinda"/>
+        <a:font script="Gujr" typeface="Shruti"/>
+        <a:font script="Khmr" typeface="MoolBoran"/>
+        <a:font script="Knda" typeface="Tunga"/>
+        <a:font script="Guru" typeface="Raavi"/>
+        <a:font script="Cans" typeface="Euphemia"/>
+        <a:font script="Cher" typeface="Plantagenet Cherokee"/>
+        <a:font script="Yiii" typeface="Microsoft Yi Baiti"/>
+        <a:font script="Tibt" typeface="Microsoft Himalaya"/>
+        <a:font script="Thaa" typeface="MV Boli"/>
+        <a:font script="Deva" typeface="Mangal"/>
+        <a:font script="Telu" typeface="Gautami"/>
+        <a:font script="Taml" typeface="Latha"/>
+        <a:font script="Syrc" typeface="Estrangelo Edessa"/>
+        <a:font script="Orya" typeface="Kalinga"/>
+        <a:font script="Mlym" typeface="Kartika"/>
+        <a:font script="Laoo" typeface="DokChampa"/>
+        <a:font script="Sinh" typeface="Iskoola Pota"/>
+        <a:font script="Mong" typeface="Mongolian Baiti"/>
+        <a:font script="Viet" typeface="Times New Roman"/>
+        <a:font script="Uigh" typeface="Microsoft Uighur"/>
+        <a:font script="Geor" typeface="Sylfaen"/>
+      </a:majorFont>
+      <a:minorFont>
+        <a:latin typeface="Calibri" panose="020F0502020204030204"/>
+        <a:ea typeface=""/>
+        <a:cs typeface=""/>
+        <a:font script="Jpan" typeface="ＭＳ Ｐゴシック"/>
+        <a:font script="Hang" typeface="맑은 고딕"/>
+        <a:font script="Hans" typeface="宋体"/>
+        <a:font script="Hant" typeface="新細明體"/>
+        <a:font script="Arab" typeface="Arial"/>
+        <a:font script="Hebr" typeface="Arial"/>
+        <a:font script="Thai" typeface="Cordia New"/>
+        <a:font script="Ethi" typeface="Nyala"/>
+        <a:font script="Beng" typeface="Vrinda"/>
+        <a:font script="Gujr" typeface="Shruti"/>
+        <a:font script="Khmr" typeface="DaunPenh"/>
+        <a:font script="Knda" typeface="Tunga"/>
+        <a:font script="Guru" typeface="Raavi"/>
+        <a:font script="Cans" typeface="Euphemia"/>
+        <a:font script="Cher" typeface="Plantagenet Cherokee"/>
+        <a:font script="Yiii" typeface="Microsoft Yi Baiti"/>
+        <a:font script="Tibt" typeface="Microsoft Himalaya"/>
+        <a:font script="Thaa" typeface="MV Boli"/>
+        <a:font script="Deva" typeface="Mangal"/>
+        <a:font script="Telu" typeface="Gautami"/>
+        <a:font script="Taml" typeface="Latha"/>
+        <a:font script="Syrc" typeface="Estrangelo Edessa"/>
+        <a:font script="Orya" typeface="Kalinga"/>
+        <a:font script="Mlym" typeface="Kartika"/>
+        <a:font script="Laoo" typeface="DokChampa"/>
+        <a:font script="Sinh" typeface="Iskoola Pota"/>
+        <a:font script="Mong" typeface="Mongolian Baiti"/>
+        <a:font script="Viet" typeface="Arial"/>
+        <a:font script="Uigh" typeface="Microsoft Uighur"/>
+        <a:font script="Geor" typeface="Sylfaen"/>
+      </a:minorFont>
+    </a:fontScheme>
+    <a:fmtScheme name="Office">
+      <a:fillStyleLst>
+        <a:solidFill>
+          <a:schemeClr val="phClr"/>
+        </a:solidFill>
+        <a:gradFill rotWithShape="1">
+          <a:gsLst>
+            <a:gs pos="0">
+              <a:schemeClr val="phClr">
+                <a:lumMod val="110000"/>
+                <a:satMod val="105000"/>
+                <a:tint val="67000"/>
+              </a:schemeClr>
+            </a:gs>
+            <a:gs pos="50000">
+              <a:schemeClr val="phClr">
+                <a:lumMod val="105000"/>
+                <a:satMod val="103000"/>
+                <a:tint val="73000"/>
+              </a:schemeClr>
+            </a:gs>
+            <a:gs pos="100000">
+              <a:schemeClr val="phClr">
+                <a:lumMod val="105000"/>
+                <a:satMod val="109000"/>
+                <a:tint val="81000"/>
+              </a:schemeClr>
+            </a:gs>
+          </a:gsLst>
+          <a:lin ang="5400000" scaled="0"/>
+        </a:gradFill>
+        <a:gradFill rotWithShape="1">
+          <a:gsLst>
+            <a:gs pos="0">
+              <a:schemeClr val="phClr">
+                <a:satMod val="103000"/>
+                <a:lumMod val="102000"/>
+                <a:tint val="94000"/>
+              </a:schemeClr>
+            </a:gs>
+            <a:gs pos="50000">
+              <a:schemeClr val="phClr">
+                <a:satMod val="110000"/>
+                <a:lumMod val="100000"/>
+                <a:shade val="100000"/>
+              </a:schemeClr>
+            </a:gs>
+            <a:gs pos="100000">
+              <a:schemeClr val="phClr">
+                <a:lumMod val="99000"/>
+                <a:satMod val="120000"/>
+                <a:shade val="78000"/>
+              </a:schemeClr>
+            </a:gs>
+          </a:gsLst>
+          <a:lin ang="5400000" scaled="0"/>
+        </a:gradFill>
+      </a:fillStyleLst>
+      <a:lnStyleLst>
+        <a:ln w="6350" cap="flat" cmpd="sng" algn="ctr">
+          <a:solidFill>
+            <a:schemeClr val="phClr"/>
+          </a:solidFill>
+          <a:prstDash val="solid"/>
+          <a:miter lim="800000"/>
+        </a:ln>
+        <a:ln w="12700" cap="flat" cmpd="sng" algn="ctr">
+          <a:solidFill>
+            <a:schemeClr val="phClr"/>
+          </a:solidFill>
+          <a:prstDash val="solid"/>
+          <a:miter lim="800000"/>
+        </a:ln>
+        <a:ln w="19050" cap="flat" cmpd="sng" algn="ctr">
+          <a:solidFill>
+            <a:schemeClr val="phClr"/>
+          </a:solidFill>
+          <a:prstDash val="solid"/>
+          <a:miter lim="800000"/>
+        </a:ln>
+      </a:lnStyleLst>
+      <a:effectStyleLst>
+        <a:effectStyle>
+          <a:effectLst/>
+        </a:effectStyle>
+        <a:effectStyle>
+          <a:effectLst/>
+        </a:effectStyle>
+        <a:effectStyle>
+          <a:effectLst>
+            <a:outerShdw blurRad="57150" dist="19050" dir="5400000" algn="ctr" rotWithShape="0">
+              <a:srgbClr val="000000">
+                <a:alpha val="63000"/>
+              </a:srgbClr>
+            </a:outerShdw>
+          </a:effectLst>
+        </a:effectStyle>
+      </a:effectStyleLst>
+      <a:bgFillStyleLst>
+        <a:solidFill>
+          <a:schemeClr val="phClr"/>
+        </a:solidFill>
+        <a:solidFill>
+          <a:schemeClr val="phClr">
+            <a:tint val="95000"/>
+            <a:satMod val="170000"/>
+          </a:schemeClr>
+        </a:solidFill>
+        <a:gradFill rotWithShape="1">
+          <a:gsLst>
+            <a:gs pos="0">
+              <a:schemeClr val="phClr">
+                <a:tint val="93000"/>
+                <a:satMod val="150000"/>
+                <a:shade val="98000"/>
+                <a:lumMod val="102000"/>
+              </a:schemeClr>
+            </a:gs>
+            <a:gs pos="50000">
+              <a:schemeClr val="phClr">
+                <a:tint val="98000"/>
+                <a:satMod val="130000"/>
+                <a:shade val="90000"/>
+                <a:lumMod val="103000"/>
+              </a:schemeClr>
+            </a:gs>
+            <a:gs pos="100000">
+              <a:schemeClr val="phClr">
+                <a:shade val="63000"/>
+                <a:satMod val="120000"/>
+              </a:schemeClr>
+            </a:gs>
+          </a:gsLst>
+          <a:lin ang="5400000" scaled="0"/>
+        </a:gradFill>
+      </a:bgFillStyleLst>
+    </a:fmtScheme>
+  </a:themeElements>
+  <a:objectDefaults/>
+  <a:extraClrSchemeLst/>
+  <a:extLst>
+    <a:ext uri="{05A4C25C-085E-4340-85A3-A5531E510DB2}">
+      <thm15:themeFamily xmlns:thm15="http://schemas.microsoft.com/office/thememl/2012/main" name="Office Theme" id="{62F939B6-93AF-4DB8-9C6B-D6C7DFDC589F}" vid="{4A3C46E8-61CC-4603-A589-7422A47A8E4A}"/>
+    </a:ext>
+  </a:extLst>
+</a:theme>
 </file>
</xml_diff>